<commit_message>
added equations to math and EM
</commit_message>
<xml_diff>
--- a/images/physics/ImageHelper.pptx
+++ b/images/physics/ImageHelper.pptx
@@ -6,6 +6,7 @@
   </p:sldMasterIdLst>
   <p:sldIdLst>
     <p:sldId id="256" r:id="rId2"/>
+    <p:sldId id="257" r:id="rId3"/>
   </p:sldIdLst>
   <p:sldSz cx="9144000" cy="6858000" type="screen4x3"/>
   <p:notesSz cx="6858000" cy="9144000"/>
@@ -288,7 +289,7 @@
           <a:p>
             <a:fld id="{6F65EB4C-219A-4F63-8F88-E2873D3D6801}" type="datetimeFigureOut">
               <a:rPr lang="en-US" smtClean="0"/>
-              <a:t>3/24/2018</a:t>
+              <a:t>3/1/2019</a:t>
             </a:fld>
             <a:endParaRPr lang="en-US"/>
           </a:p>
@@ -458,7 +459,7 @@
           <a:p>
             <a:fld id="{6F65EB4C-219A-4F63-8F88-E2873D3D6801}" type="datetimeFigureOut">
               <a:rPr lang="en-US" smtClean="0"/>
-              <a:t>3/24/2018</a:t>
+              <a:t>3/1/2019</a:t>
             </a:fld>
             <a:endParaRPr lang="en-US"/>
           </a:p>
@@ -638,7 +639,7 @@
           <a:p>
             <a:fld id="{6F65EB4C-219A-4F63-8F88-E2873D3D6801}" type="datetimeFigureOut">
               <a:rPr lang="en-US" smtClean="0"/>
-              <a:t>3/24/2018</a:t>
+              <a:t>3/1/2019</a:t>
             </a:fld>
             <a:endParaRPr lang="en-US"/>
           </a:p>
@@ -808,7 +809,7 @@
           <a:p>
             <a:fld id="{6F65EB4C-219A-4F63-8F88-E2873D3D6801}" type="datetimeFigureOut">
               <a:rPr lang="en-US" smtClean="0"/>
-              <a:t>3/24/2018</a:t>
+              <a:t>3/1/2019</a:t>
             </a:fld>
             <a:endParaRPr lang="en-US"/>
           </a:p>
@@ -1054,7 +1055,7 @@
           <a:p>
             <a:fld id="{6F65EB4C-219A-4F63-8F88-E2873D3D6801}" type="datetimeFigureOut">
               <a:rPr lang="en-US" smtClean="0"/>
-              <a:t>3/24/2018</a:t>
+              <a:t>3/1/2019</a:t>
             </a:fld>
             <a:endParaRPr lang="en-US"/>
           </a:p>
@@ -1342,7 +1343,7 @@
           <a:p>
             <a:fld id="{6F65EB4C-219A-4F63-8F88-E2873D3D6801}" type="datetimeFigureOut">
               <a:rPr lang="en-US" smtClean="0"/>
-              <a:t>3/24/2018</a:t>
+              <a:t>3/1/2019</a:t>
             </a:fld>
             <a:endParaRPr lang="en-US"/>
           </a:p>
@@ -1764,7 +1765,7 @@
           <a:p>
             <a:fld id="{6F65EB4C-219A-4F63-8F88-E2873D3D6801}" type="datetimeFigureOut">
               <a:rPr lang="en-US" smtClean="0"/>
-              <a:t>3/24/2018</a:t>
+              <a:t>3/1/2019</a:t>
             </a:fld>
             <a:endParaRPr lang="en-US"/>
           </a:p>
@@ -1882,7 +1883,7 @@
           <a:p>
             <a:fld id="{6F65EB4C-219A-4F63-8F88-E2873D3D6801}" type="datetimeFigureOut">
               <a:rPr lang="en-US" smtClean="0"/>
-              <a:t>3/24/2018</a:t>
+              <a:t>3/1/2019</a:t>
             </a:fld>
             <a:endParaRPr lang="en-US"/>
           </a:p>
@@ -1977,7 +1978,7 @@
           <a:p>
             <a:fld id="{6F65EB4C-219A-4F63-8F88-E2873D3D6801}" type="datetimeFigureOut">
               <a:rPr lang="en-US" smtClean="0"/>
-              <a:t>3/24/2018</a:t>
+              <a:t>3/1/2019</a:t>
             </a:fld>
             <a:endParaRPr lang="en-US"/>
           </a:p>
@@ -2254,7 +2255,7 @@
           <a:p>
             <a:fld id="{6F65EB4C-219A-4F63-8F88-E2873D3D6801}" type="datetimeFigureOut">
               <a:rPr lang="en-US" smtClean="0"/>
-              <a:t>3/24/2018</a:t>
+              <a:t>3/1/2019</a:t>
             </a:fld>
             <a:endParaRPr lang="en-US"/>
           </a:p>
@@ -2507,7 +2508,7 @@
           <a:p>
             <a:fld id="{6F65EB4C-219A-4F63-8F88-E2873D3D6801}" type="datetimeFigureOut">
               <a:rPr lang="en-US" smtClean="0"/>
-              <a:t>3/24/2018</a:t>
+              <a:t>3/1/2019</a:t>
             </a:fld>
             <a:endParaRPr lang="en-US"/>
           </a:p>
@@ -2720,7 +2721,7 @@
           <a:p>
             <a:fld id="{6F65EB4C-219A-4F63-8F88-E2873D3D6801}" type="datetimeFigureOut">
               <a:rPr lang="en-US" smtClean="0"/>
-              <a:t>3/24/2018</a:t>
+              <a:t>3/1/2019</a:t>
             </a:fld>
             <a:endParaRPr lang="en-US"/>
           </a:p>
@@ -3237,8 +3238,8 @@
           </a:fontRef>
         </p:style>
       </p:cxnSp>
-      <mc:AlternateContent xmlns:mc="http://schemas.openxmlformats.org/markup-compatibility/2006">
-        <mc:Choice xmlns:a14="http://schemas.microsoft.com/office/drawing/2010/main" Requires="a14">
+      <mc:AlternateContent xmlns:mc="http://schemas.openxmlformats.org/markup-compatibility/2006" xmlns:a14="http://schemas.microsoft.com/office/drawing/2010/main">
+        <mc:Choice Requires="a14">
           <p:sp>
             <p:nvSpPr>
               <p:cNvPr id="15" name="TextBox 14"/>
@@ -3261,6 +3262,7 @@
               </a:bodyPr>
               <a:lstStyle/>
               <a:p>
+                <a:pPr/>
                 <a14:m>
                   <m:oMathPara xmlns:m="http://schemas.openxmlformats.org/officeDocument/2006/math">
                     <m:oMathParaPr>
@@ -3312,7 +3314,7 @@
             </p:txBody>
           </p:sp>
         </mc:Choice>
-        <mc:Fallback>
+        <mc:Fallback xmlns="">
           <p:sp>
             <p:nvSpPr>
               <p:cNvPr id="15" name="TextBox 14"/>
@@ -3351,8 +3353,8 @@
           </p:sp>
         </mc:Fallback>
       </mc:AlternateContent>
-      <mc:AlternateContent xmlns:mc="http://schemas.openxmlformats.org/markup-compatibility/2006">
-        <mc:Choice xmlns:a14="http://schemas.microsoft.com/office/drawing/2010/main" Requires="a14">
+      <mc:AlternateContent xmlns:mc="http://schemas.openxmlformats.org/markup-compatibility/2006" xmlns:a14="http://schemas.microsoft.com/office/drawing/2010/main">
+        <mc:Choice Requires="a14">
           <p:sp>
             <p:nvSpPr>
               <p:cNvPr id="16" name="TextBox 15"/>
@@ -3375,6 +3377,7 @@
               </a:bodyPr>
               <a:lstStyle/>
               <a:p>
+                <a:pPr/>
                 <a14:m>
                   <m:oMathPara xmlns:m="http://schemas.openxmlformats.org/officeDocument/2006/math">
                     <m:oMathParaPr>
@@ -3426,7 +3429,7 @@
             </p:txBody>
           </p:sp>
         </mc:Choice>
-        <mc:Fallback>
+        <mc:Fallback xmlns="">
           <p:sp>
             <p:nvSpPr>
               <p:cNvPr id="16" name="TextBox 15"/>
@@ -3469,6 +3472,234 @@
     <p:extLst>
       <p:ext uri="{BB962C8B-B14F-4D97-AF65-F5344CB8AC3E}">
         <p14:creationId xmlns:p14="http://schemas.microsoft.com/office/powerpoint/2010/main" val="2410308633"/>
+      </p:ext>
+    </p:extLst>
+  </p:cSld>
+  <p:clrMapOvr>
+    <a:masterClrMapping/>
+  </p:clrMapOvr>
+</p:sld>
+</file>
+
+<file path=ppt/slides/slide2.xml><?xml version="1.0" encoding="utf-8"?>
+<p:sld xmlns:a="http://schemas.openxmlformats.org/drawingml/2006/main" xmlns:r="http://schemas.openxmlformats.org/officeDocument/2006/relationships" xmlns:p="http://schemas.openxmlformats.org/presentationml/2006/main">
+  <p:cSld>
+    <p:spTree>
+      <p:nvGrpSpPr>
+        <p:cNvPr id="1" name=""/>
+        <p:cNvGrpSpPr/>
+        <p:nvPr/>
+      </p:nvGrpSpPr>
+      <p:grpSpPr>
+        <a:xfrm>
+          <a:off x="0" y="0"/>
+          <a:ext cx="0" cy="0"/>
+          <a:chOff x="0" y="0"/>
+          <a:chExt cx="0" cy="0"/>
+        </a:xfrm>
+      </p:grpSpPr>
+      <p:pic>
+        <p:nvPicPr>
+          <p:cNvPr id="4" name="Content Placeholder 3"/>
+          <p:cNvPicPr>
+            <a:picLocks noGrp="1" noChangeAspect="1"/>
+          </p:cNvPicPr>
+          <p:nvPr>
+            <p:ph idx="1"/>
+          </p:nvPr>
+        </p:nvPicPr>
+        <p:blipFill>
+          <a:blip r:embed="rId2">
+            <a:clrChange>
+              <a:clrFrom>
+                <a:srgbClr val="FFFFFF"/>
+              </a:clrFrom>
+              <a:clrTo>
+                <a:srgbClr val="FFFFFF">
+                  <a:alpha val="0"/>
+                </a:srgbClr>
+              </a:clrTo>
+            </a:clrChange>
+            <a:extLst>
+              <a:ext uri="{28A0092B-C50C-407E-A947-70E740481C1C}">
+                <a14:useLocalDpi xmlns:a14="http://schemas.microsoft.com/office/drawing/2010/main" val="0"/>
+              </a:ext>
+            </a:extLst>
+          </a:blip>
+          <a:stretch>
+            <a:fillRect/>
+          </a:stretch>
+        </p:blipFill>
+        <p:spPr>
+          <a:xfrm>
+            <a:off x="5260156" y="4297527"/>
+            <a:ext cx="1124107" cy="1267002"/>
+          </a:xfrm>
+        </p:spPr>
+      </p:pic>
+      <p:pic>
+        <p:nvPicPr>
+          <p:cNvPr id="5" name="Picture 4"/>
+          <p:cNvPicPr>
+            <a:picLocks noChangeAspect="1"/>
+          </p:cNvPicPr>
+          <p:nvPr/>
+        </p:nvPicPr>
+        <p:blipFill>
+          <a:blip r:embed="rId3">
+            <a:clrChange>
+              <a:clrFrom>
+                <a:srgbClr val="FFFFFF"/>
+              </a:clrFrom>
+              <a:clrTo>
+                <a:srgbClr val="FFFFFF">
+                  <a:alpha val="0"/>
+                </a:srgbClr>
+              </a:clrTo>
+            </a:clrChange>
+            <a:extLst>
+              <a:ext uri="{28A0092B-C50C-407E-A947-70E740481C1C}">
+                <a14:useLocalDpi xmlns:a14="http://schemas.microsoft.com/office/drawing/2010/main" val="0"/>
+              </a:ext>
+            </a:extLst>
+          </a:blip>
+          <a:stretch>
+            <a:fillRect/>
+          </a:stretch>
+        </p:blipFill>
+        <p:spPr>
+          <a:xfrm>
+            <a:off x="1409035" y="3657600"/>
+            <a:ext cx="1371791" cy="1362265"/>
+          </a:xfrm>
+          <a:prstGeom prst="rect">
+            <a:avLst/>
+          </a:prstGeom>
+        </p:spPr>
+      </p:pic>
+      <p:pic>
+        <p:nvPicPr>
+          <p:cNvPr id="6" name="Picture 5"/>
+          <p:cNvPicPr>
+            <a:picLocks noChangeAspect="1"/>
+          </p:cNvPicPr>
+          <p:nvPr/>
+        </p:nvPicPr>
+        <p:blipFill>
+          <a:blip r:embed="rId4">
+            <a:clrChange>
+              <a:clrFrom>
+                <a:srgbClr val="FFFFFF"/>
+              </a:clrFrom>
+              <a:clrTo>
+                <a:srgbClr val="FFFFFF">
+                  <a:alpha val="0"/>
+                </a:srgbClr>
+              </a:clrTo>
+            </a:clrChange>
+            <a:extLst>
+              <a:ext uri="{28A0092B-C50C-407E-A947-70E740481C1C}">
+                <a14:useLocalDpi xmlns:a14="http://schemas.microsoft.com/office/drawing/2010/main" val="0"/>
+              </a:ext>
+            </a:extLst>
+          </a:blip>
+          <a:stretch>
+            <a:fillRect/>
+          </a:stretch>
+        </p:blipFill>
+        <p:spPr>
+          <a:xfrm>
+            <a:off x="6172200" y="2324350"/>
+            <a:ext cx="2353003" cy="1733792"/>
+          </a:xfrm>
+          <a:prstGeom prst="rect">
+            <a:avLst/>
+          </a:prstGeom>
+        </p:spPr>
+      </p:pic>
+      <p:pic>
+        <p:nvPicPr>
+          <p:cNvPr id="7" name="Picture 6"/>
+          <p:cNvPicPr>
+            <a:picLocks noChangeAspect="1"/>
+          </p:cNvPicPr>
+          <p:nvPr/>
+        </p:nvPicPr>
+        <p:blipFill>
+          <a:blip r:embed="rId5">
+            <a:clrChange>
+              <a:clrFrom>
+                <a:srgbClr val="FFFFFF"/>
+              </a:clrFrom>
+              <a:clrTo>
+                <a:srgbClr val="FFFFFF">
+                  <a:alpha val="0"/>
+                </a:srgbClr>
+              </a:clrTo>
+            </a:clrChange>
+            <a:extLst>
+              <a:ext uri="{28A0092B-C50C-407E-A947-70E740481C1C}">
+                <a14:useLocalDpi xmlns:a14="http://schemas.microsoft.com/office/drawing/2010/main" val="0"/>
+              </a:ext>
+            </a:extLst>
+          </a:blip>
+          <a:stretch>
+            <a:fillRect/>
+          </a:stretch>
+        </p:blipFill>
+        <p:spPr>
+          <a:xfrm>
+            <a:off x="4221787" y="533400"/>
+            <a:ext cx="1600423" cy="1790950"/>
+          </a:xfrm>
+          <a:prstGeom prst="rect">
+            <a:avLst/>
+          </a:prstGeom>
+        </p:spPr>
+      </p:pic>
+      <p:pic>
+        <p:nvPicPr>
+          <p:cNvPr id="8" name="Picture 7"/>
+          <p:cNvPicPr>
+            <a:picLocks noChangeAspect="1"/>
+          </p:cNvPicPr>
+          <p:nvPr/>
+        </p:nvPicPr>
+        <p:blipFill rotWithShape="1">
+          <a:blip r:embed="rId6">
+            <a:clrChange>
+              <a:clrFrom>
+                <a:srgbClr val="FFFFFF"/>
+              </a:clrFrom>
+              <a:clrTo>
+                <a:srgbClr val="FFFFFF">
+                  <a:alpha val="0"/>
+                </a:srgbClr>
+              </a:clrTo>
+            </a:clrChange>
+            <a:extLst>
+              <a:ext uri="{28A0092B-C50C-407E-A947-70E740481C1C}">
+                <a14:useLocalDpi xmlns:a14="http://schemas.microsoft.com/office/drawing/2010/main" val="0"/>
+              </a:ext>
+            </a:extLst>
+          </a:blip>
+          <a:srcRect l="13058" t="21091" r="9554" b="10477"/>
+          <a:stretch/>
+        </p:blipFill>
+        <p:spPr>
+          <a:xfrm>
+            <a:off x="1269242" y="955343"/>
+            <a:ext cx="1651379" cy="1369008"/>
+          </a:xfrm>
+          <a:prstGeom prst="rect">
+            <a:avLst/>
+          </a:prstGeom>
+        </p:spPr>
+      </p:pic>
+    </p:spTree>
+    <p:extLst>
+      <p:ext uri="{BB962C8B-B14F-4D97-AF65-F5344CB8AC3E}">
+        <p14:creationId xmlns:p14="http://schemas.microsoft.com/office/powerpoint/2010/main" val="3218595079"/>
       </p:ext>
     </p:extLst>
   </p:cSld>

</xml_diff>